<commit_message>
Session 2: add cache variables section
</commit_message>
<xml_diff>
--- a/Session 1 - CMake and Building CXX.pptx
+++ b/Session 1 - CMake and Building CXX.pptx
@@ -138,6 +138,11 @@
       </a:defRPr>
     </a:lvl9pPr>
   </p:defaultTextStyle>
+  <p:extLst>
+    <p:ext uri="{EFAFB233-063F-42B5-8137-9DF3F51BA10A}">
+      <p15:sldGuideLst xmlns:p15="http://schemas.microsoft.com/office/powerpoint/2012/main"/>
+    </p:ext>
+  </p:extLst>
 </p:presentation>
 </file>
 
@@ -371,7 +376,7 @@
             <a:fld id="{B61BEF0D-F0BB-DE4B-95CE-6DB70DBA9567}" type="datetimeFigureOut">
               <a:rPr lang="en-US" dirty="0"/>
               <a:pPr/>
-              <a:t>3/28/2020</a:t>
+              <a:t>3/29/2020</a:t>
             </a:fld>
             <a:endParaRPr lang="en-US" dirty="0"/>
           </a:p>
@@ -702,7 +707,7 @@
             <a:fld id="{B61BEF0D-F0BB-DE4B-95CE-6DB70DBA9567}" type="datetimeFigureOut">
               <a:rPr lang="en-US" dirty="0"/>
               <a:pPr/>
-              <a:t>3/28/2020</a:t>
+              <a:t>3/29/2020</a:t>
             </a:fld>
             <a:endParaRPr lang="en-US" dirty="0"/>
           </a:p>
@@ -977,7 +982,7 @@
             <a:fld id="{B61BEF0D-F0BB-DE4B-95CE-6DB70DBA9567}" type="datetimeFigureOut">
               <a:rPr lang="en-US" dirty="0"/>
               <a:pPr/>
-              <a:t>3/28/2020</a:t>
+              <a:t>3/29/2020</a:t>
             </a:fld>
             <a:endParaRPr lang="en-US" dirty="0"/>
           </a:p>
@@ -1542,7 +1547,7 @@
             <a:fld id="{B61BEF0D-F0BB-DE4B-95CE-6DB70DBA9567}" type="datetimeFigureOut">
               <a:rPr lang="en-US" dirty="0"/>
               <a:pPr/>
-              <a:t>3/28/2020</a:t>
+              <a:t>3/29/2020</a:t>
             </a:fld>
             <a:endParaRPr lang="en-US" dirty="0"/>
           </a:p>
@@ -1817,7 +1822,7 @@
             <a:fld id="{B61BEF0D-F0BB-DE4B-95CE-6DB70DBA9567}" type="datetimeFigureOut">
               <a:rPr lang="en-US" dirty="0"/>
               <a:pPr/>
-              <a:t>3/28/2020</a:t>
+              <a:t>3/29/2020</a:t>
             </a:fld>
             <a:endParaRPr lang="en-US" dirty="0"/>
           </a:p>
@@ -2376,7 +2381,7 @@
             <a:fld id="{B61BEF0D-F0BB-DE4B-95CE-6DB70DBA9567}" type="datetimeFigureOut">
               <a:rPr lang="en-US" dirty="0"/>
               <a:pPr/>
-              <a:t>3/28/2020</a:t>
+              <a:t>3/29/2020</a:t>
             </a:fld>
             <a:endParaRPr lang="en-US" dirty="0"/>
           </a:p>
@@ -2700,7 +2705,7 @@
             <a:fld id="{B61BEF0D-F0BB-DE4B-95CE-6DB70DBA9567}" type="datetimeFigureOut">
               <a:rPr lang="en-US" dirty="0"/>
               <a:pPr/>
-              <a:t>3/28/2020</a:t>
+              <a:t>3/29/2020</a:t>
             </a:fld>
             <a:endParaRPr lang="en-US" dirty="0"/>
           </a:p>
@@ -2874,7 +2879,7 @@
             <a:fld id="{B61BEF0D-F0BB-DE4B-95CE-6DB70DBA9567}" type="datetimeFigureOut">
               <a:rPr lang="en-US" dirty="0"/>
               <a:pPr/>
-              <a:t>3/28/2020</a:t>
+              <a:t>3/29/2020</a:t>
             </a:fld>
             <a:endParaRPr lang="en-US" dirty="0"/>
           </a:p>
@@ -3109,7 +3114,7 @@
             <a:fld id="{B61BEF0D-F0BB-DE4B-95CE-6DB70DBA9567}" type="datetimeFigureOut">
               <a:rPr lang="en-US" dirty="0"/>
               <a:pPr/>
-              <a:t>3/28/2020</a:t>
+              <a:t>3/29/2020</a:t>
             </a:fld>
             <a:endParaRPr lang="en-US" dirty="0"/>
           </a:p>
@@ -3306,7 +3311,7 @@
             <a:fld id="{B61BEF0D-F0BB-DE4B-95CE-6DB70DBA9567}" type="datetimeFigureOut">
               <a:rPr lang="en-US" dirty="0"/>
               <a:pPr/>
-              <a:t>3/28/2020</a:t>
+              <a:t>3/29/2020</a:t>
             </a:fld>
             <a:endParaRPr lang="en-US" dirty="0"/>
           </a:p>
@@ -3580,7 +3585,7 @@
             <a:fld id="{B61BEF0D-F0BB-DE4B-95CE-6DB70DBA9567}" type="datetimeFigureOut">
               <a:rPr lang="en-US" dirty="0"/>
               <a:pPr/>
-              <a:t>3/28/2020</a:t>
+              <a:t>3/29/2020</a:t>
             </a:fld>
             <a:endParaRPr lang="en-US" dirty="0"/>
           </a:p>
@@ -3843,7 +3848,7 @@
             <a:fld id="{B61BEF0D-F0BB-DE4B-95CE-6DB70DBA9567}" type="datetimeFigureOut">
               <a:rPr lang="en-US" dirty="0"/>
               <a:pPr/>
-              <a:t>3/28/2020</a:t>
+              <a:t>3/29/2020</a:t>
             </a:fld>
             <a:endParaRPr lang="en-US" dirty="0"/>
           </a:p>
@@ -4214,7 +4219,7 @@
             <a:fld id="{B61BEF0D-F0BB-DE4B-95CE-6DB70DBA9567}" type="datetimeFigureOut">
               <a:rPr lang="en-US" dirty="0"/>
               <a:pPr/>
-              <a:t>3/28/2020</a:t>
+              <a:t>3/29/2020</a:t>
             </a:fld>
             <a:endParaRPr lang="en-US" dirty="0"/>
           </a:p>
@@ -4359,7 +4364,7 @@
             <a:fld id="{B61BEF0D-F0BB-DE4B-95CE-6DB70DBA9567}" type="datetimeFigureOut">
               <a:rPr lang="en-US" dirty="0"/>
               <a:pPr/>
-              <a:t>3/28/2020</a:t>
+              <a:t>3/29/2020</a:t>
             </a:fld>
             <a:endParaRPr lang="en-US" dirty="0"/>
           </a:p>
@@ -4481,7 +4486,7 @@
             <a:fld id="{B61BEF0D-F0BB-DE4B-95CE-6DB70DBA9567}" type="datetimeFigureOut">
               <a:rPr lang="en-US" dirty="0"/>
               <a:pPr/>
-              <a:t>3/28/2020</a:t>
+              <a:t>3/29/2020</a:t>
             </a:fld>
             <a:endParaRPr lang="en-US" dirty="0"/>
           </a:p>
@@ -4763,7 +4768,7 @@
             <a:fld id="{B61BEF0D-F0BB-DE4B-95CE-6DB70DBA9567}" type="datetimeFigureOut">
               <a:rPr lang="en-US" dirty="0"/>
               <a:pPr/>
-              <a:t>3/28/2020</a:t>
+              <a:t>3/29/2020</a:t>
             </a:fld>
             <a:endParaRPr lang="en-US" dirty="0"/>
           </a:p>
@@ -5084,7 +5089,7 @@
             <a:fld id="{B61BEF0D-F0BB-DE4B-95CE-6DB70DBA9567}" type="datetimeFigureOut">
               <a:rPr lang="en-US" dirty="0"/>
               <a:pPr/>
-              <a:t>3/28/2020</a:t>
+              <a:t>3/29/2020</a:t>
             </a:fld>
             <a:endParaRPr lang="en-US" dirty="0"/>
           </a:p>
@@ -5293,7 +5298,7 @@
             <a:fld id="{B61BEF0D-F0BB-DE4B-95CE-6DB70DBA9567}" type="datetimeFigureOut">
               <a:rPr lang="en-US" dirty="0"/>
               <a:pPr/>
-              <a:t>3/28/2020</a:t>
+              <a:t>3/29/2020</a:t>
             </a:fld>
             <a:endParaRPr lang="en-US" dirty="0"/>
           </a:p>
@@ -8901,13 +8906,18 @@
             </a:r>
             <a:r>
               <a:rPr lang="en-US" dirty="0"/>
-              <a:t>software project.  You cannot write any serious code without a good build system.</a:t>
-            </a:r>
-          </a:p>
-          <a:p>
-            <a:r>
-              <a:rPr lang="en-US" dirty="0"/>
-              <a:t>If you can stick it out through this series of 4 lectures, you will know more about C++ build systems than 75% of professional software engineers (if Qualcomm is any judge)</a:t>
+              <a:t>software project.  You cannot write any serious code without a good build </a:t>
+            </a:r>
+            <a:r>
+              <a:rPr lang="en-US"/>
+              <a:t>system supporting you.</a:t>
+            </a:r>
+            <a:endParaRPr lang="en-US" dirty="0"/>
+          </a:p>
+          <a:p>
+            <a:r>
+              <a:rPr lang="en-US" dirty="0"/>
+              <a:t>If you can stick it out through this series of 5 lectures, you will know more about C++ build systems than 75% of professional software engineers (if Qualcomm is any judge)</a:t>
             </a:r>
           </a:p>
           <a:p>

</xml_diff>

<commit_message>
Add WSL guide link to README
</commit_message>
<xml_diff>
--- a/Session 1 - CMake and Building CXX.pptx
+++ b/Session 1 - CMake and Building CXX.pptx
@@ -376,7 +376,7 @@
             <a:fld id="{B61BEF0D-F0BB-DE4B-95CE-6DB70DBA9567}" type="datetimeFigureOut">
               <a:rPr lang="en-US" dirty="0"/>
               <a:pPr/>
-              <a:t>4/1/2020</a:t>
+              <a:t>4/2/2020</a:t>
             </a:fld>
             <a:endParaRPr lang="en-US" dirty="0"/>
           </a:p>
@@ -707,7 +707,7 @@
             <a:fld id="{B61BEF0D-F0BB-DE4B-95CE-6DB70DBA9567}" type="datetimeFigureOut">
               <a:rPr lang="en-US" dirty="0"/>
               <a:pPr/>
-              <a:t>4/1/2020</a:t>
+              <a:t>4/2/2020</a:t>
             </a:fld>
             <a:endParaRPr lang="en-US" dirty="0"/>
           </a:p>
@@ -982,7 +982,7 @@
             <a:fld id="{B61BEF0D-F0BB-DE4B-95CE-6DB70DBA9567}" type="datetimeFigureOut">
               <a:rPr lang="en-US" dirty="0"/>
               <a:pPr/>
-              <a:t>4/1/2020</a:t>
+              <a:t>4/2/2020</a:t>
             </a:fld>
             <a:endParaRPr lang="en-US" dirty="0"/>
           </a:p>
@@ -1547,7 +1547,7 @@
             <a:fld id="{B61BEF0D-F0BB-DE4B-95CE-6DB70DBA9567}" type="datetimeFigureOut">
               <a:rPr lang="en-US" dirty="0"/>
               <a:pPr/>
-              <a:t>4/1/2020</a:t>
+              <a:t>4/2/2020</a:t>
             </a:fld>
             <a:endParaRPr lang="en-US" dirty="0"/>
           </a:p>
@@ -1822,7 +1822,7 @@
             <a:fld id="{B61BEF0D-F0BB-DE4B-95CE-6DB70DBA9567}" type="datetimeFigureOut">
               <a:rPr lang="en-US" dirty="0"/>
               <a:pPr/>
-              <a:t>4/1/2020</a:t>
+              <a:t>4/2/2020</a:t>
             </a:fld>
             <a:endParaRPr lang="en-US" dirty="0"/>
           </a:p>
@@ -2381,7 +2381,7 @@
             <a:fld id="{B61BEF0D-F0BB-DE4B-95CE-6DB70DBA9567}" type="datetimeFigureOut">
               <a:rPr lang="en-US" dirty="0"/>
               <a:pPr/>
-              <a:t>4/1/2020</a:t>
+              <a:t>4/2/2020</a:t>
             </a:fld>
             <a:endParaRPr lang="en-US" dirty="0"/>
           </a:p>
@@ -2705,7 +2705,7 @@
             <a:fld id="{B61BEF0D-F0BB-DE4B-95CE-6DB70DBA9567}" type="datetimeFigureOut">
               <a:rPr lang="en-US" dirty="0"/>
               <a:pPr/>
-              <a:t>4/1/2020</a:t>
+              <a:t>4/2/2020</a:t>
             </a:fld>
             <a:endParaRPr lang="en-US" dirty="0"/>
           </a:p>
@@ -2879,7 +2879,7 @@
             <a:fld id="{B61BEF0D-F0BB-DE4B-95CE-6DB70DBA9567}" type="datetimeFigureOut">
               <a:rPr lang="en-US" dirty="0"/>
               <a:pPr/>
-              <a:t>4/1/2020</a:t>
+              <a:t>4/2/2020</a:t>
             </a:fld>
             <a:endParaRPr lang="en-US" dirty="0"/>
           </a:p>
@@ -3114,7 +3114,7 @@
             <a:fld id="{B61BEF0D-F0BB-DE4B-95CE-6DB70DBA9567}" type="datetimeFigureOut">
               <a:rPr lang="en-US" dirty="0"/>
               <a:pPr/>
-              <a:t>4/1/2020</a:t>
+              <a:t>4/2/2020</a:t>
             </a:fld>
             <a:endParaRPr lang="en-US" dirty="0"/>
           </a:p>
@@ -3311,7 +3311,7 @@
             <a:fld id="{B61BEF0D-F0BB-DE4B-95CE-6DB70DBA9567}" type="datetimeFigureOut">
               <a:rPr lang="en-US" dirty="0"/>
               <a:pPr/>
-              <a:t>4/1/2020</a:t>
+              <a:t>4/2/2020</a:t>
             </a:fld>
             <a:endParaRPr lang="en-US" dirty="0"/>
           </a:p>
@@ -3585,7 +3585,7 @@
             <a:fld id="{B61BEF0D-F0BB-DE4B-95CE-6DB70DBA9567}" type="datetimeFigureOut">
               <a:rPr lang="en-US" dirty="0"/>
               <a:pPr/>
-              <a:t>4/1/2020</a:t>
+              <a:t>4/2/2020</a:t>
             </a:fld>
             <a:endParaRPr lang="en-US" dirty="0"/>
           </a:p>
@@ -3848,7 +3848,7 @@
             <a:fld id="{B61BEF0D-F0BB-DE4B-95CE-6DB70DBA9567}" type="datetimeFigureOut">
               <a:rPr lang="en-US" dirty="0"/>
               <a:pPr/>
-              <a:t>4/1/2020</a:t>
+              <a:t>4/2/2020</a:t>
             </a:fld>
             <a:endParaRPr lang="en-US" dirty="0"/>
           </a:p>
@@ -4219,7 +4219,7 @@
             <a:fld id="{B61BEF0D-F0BB-DE4B-95CE-6DB70DBA9567}" type="datetimeFigureOut">
               <a:rPr lang="en-US" dirty="0"/>
               <a:pPr/>
-              <a:t>4/1/2020</a:t>
+              <a:t>4/2/2020</a:t>
             </a:fld>
             <a:endParaRPr lang="en-US" dirty="0"/>
           </a:p>
@@ -4364,7 +4364,7 @@
             <a:fld id="{B61BEF0D-F0BB-DE4B-95CE-6DB70DBA9567}" type="datetimeFigureOut">
               <a:rPr lang="en-US" dirty="0"/>
               <a:pPr/>
-              <a:t>4/1/2020</a:t>
+              <a:t>4/2/2020</a:t>
             </a:fld>
             <a:endParaRPr lang="en-US" dirty="0"/>
           </a:p>
@@ -4486,7 +4486,7 @@
             <a:fld id="{B61BEF0D-F0BB-DE4B-95CE-6DB70DBA9567}" type="datetimeFigureOut">
               <a:rPr lang="en-US" dirty="0"/>
               <a:pPr/>
-              <a:t>4/1/2020</a:t>
+              <a:t>4/2/2020</a:t>
             </a:fld>
             <a:endParaRPr lang="en-US" dirty="0"/>
           </a:p>
@@ -4768,7 +4768,7 @@
             <a:fld id="{B61BEF0D-F0BB-DE4B-95CE-6DB70DBA9567}" type="datetimeFigureOut">
               <a:rPr lang="en-US" dirty="0"/>
               <a:pPr/>
-              <a:t>4/1/2020</a:t>
+              <a:t>4/2/2020</a:t>
             </a:fld>
             <a:endParaRPr lang="en-US" dirty="0"/>
           </a:p>
@@ -5089,7 +5089,7 @@
             <a:fld id="{B61BEF0D-F0BB-DE4B-95CE-6DB70DBA9567}" type="datetimeFigureOut">
               <a:rPr lang="en-US" dirty="0"/>
               <a:pPr/>
-              <a:t>4/1/2020</a:t>
+              <a:t>4/2/2020</a:t>
             </a:fld>
             <a:endParaRPr lang="en-US" dirty="0"/>
           </a:p>
@@ -5298,7 +5298,7 @@
             <a:fld id="{B61BEF0D-F0BB-DE4B-95CE-6DB70DBA9567}" type="datetimeFigureOut">
               <a:rPr lang="en-US" dirty="0"/>
               <a:pPr/>
-              <a:t>4/1/2020</a:t>
+              <a:t>4/2/2020</a:t>
             </a:fld>
             <a:endParaRPr lang="en-US" dirty="0"/>
           </a:p>
@@ -7414,7 +7414,7 @@
           <p:nvPr>
             <p:extLst>
               <p:ext uri="{D42A27DB-BD31-4B8C-83A1-F6EECF244321}">
-                <p14:modId xmlns:p14="http://schemas.microsoft.com/office/powerpoint/2010/main" val="2064338260"/>
+                <p14:modId xmlns:p14="http://schemas.microsoft.com/office/powerpoint/2010/main" val="3217447327"/>
               </p:ext>
             </p:extLst>
           </p:nvPr>
@@ -7663,11 +7663,11 @@
                     <a:p>
                       <a:r>
                         <a:rPr lang="en-US" dirty="0"/>
-                        <a:t>-g3 generates even more debugging info for more detailed views, at the cost of making your code </a:t>
+                        <a:t>-g3 generates even more debugging info for more detailed views, at the cost of making your </a:t>
                       </a:r>
                       <a:r>
-                        <a:rPr lang="en-US" dirty="0" err="1"/>
-                        <a:t>larget</a:t>
+                        <a:rPr lang="en-US"/>
+                        <a:t>code larger.</a:t>
                       </a:r>
                       <a:endParaRPr lang="en-US" dirty="0"/>
                     </a:p>
@@ -12066,7 +12066,7 @@
         <p:spPr>
           <a:xfrm>
             <a:off x="530398" y="2387760"/>
-            <a:ext cx="6677957" cy="2438740"/>
+            <a:ext cx="10491829" cy="3831538"/>
           </a:xfrm>
           <a:prstGeom prst="rect">
             <a:avLst/>

</xml_diff>